<commit_message>
Update opentrack wiring diagram.pptx
</commit_message>
<xml_diff>
--- a/TheOpenPursuit/OpenTrack/opentrack wiring diagram.pptx
+++ b/TheOpenPursuit/OpenTrack/opentrack wiring diagram.pptx
@@ -104,6 +104,11 @@
       </a:defRPr>
     </a:lvl9pPr>
   </p:defaultTextStyle>
+  <p:extLst>
+    <p:ext uri="{EFAFB233-063F-42B5-8137-9DF3F51BA10A}">
+      <p15:sldGuideLst xmlns:p15="http://schemas.microsoft.com/office/powerpoint/2012/main"/>
+    </p:ext>
+  </p:extLst>
 </p:presentation>
 </file>
 
@@ -254,7 +259,7 @@
           <a:p>
             <a:fld id="{082B6261-12F7-4CA1-9F06-F80B9FCC9334}" type="datetimeFigureOut">
               <a:rPr lang="en-US" smtClean="0"/>
-              <a:t>1/25/2023</a:t>
+              <a:t>1/26/2023</a:t>
             </a:fld>
             <a:endParaRPr lang="en-US"/>
           </a:p>
@@ -452,7 +457,7 @@
           <a:p>
             <a:fld id="{082B6261-12F7-4CA1-9F06-F80B9FCC9334}" type="datetimeFigureOut">
               <a:rPr lang="en-US" smtClean="0"/>
-              <a:t>1/25/2023</a:t>
+              <a:t>1/26/2023</a:t>
             </a:fld>
             <a:endParaRPr lang="en-US"/>
           </a:p>
@@ -660,7 +665,7 @@
           <a:p>
             <a:fld id="{082B6261-12F7-4CA1-9F06-F80B9FCC9334}" type="datetimeFigureOut">
               <a:rPr lang="en-US" smtClean="0"/>
-              <a:t>1/25/2023</a:t>
+              <a:t>1/26/2023</a:t>
             </a:fld>
             <a:endParaRPr lang="en-US"/>
           </a:p>
@@ -858,7 +863,7 @@
           <a:p>
             <a:fld id="{082B6261-12F7-4CA1-9F06-F80B9FCC9334}" type="datetimeFigureOut">
               <a:rPr lang="en-US" smtClean="0"/>
-              <a:t>1/25/2023</a:t>
+              <a:t>1/26/2023</a:t>
             </a:fld>
             <a:endParaRPr lang="en-US"/>
           </a:p>
@@ -1133,7 +1138,7 @@
           <a:p>
             <a:fld id="{082B6261-12F7-4CA1-9F06-F80B9FCC9334}" type="datetimeFigureOut">
               <a:rPr lang="en-US" smtClean="0"/>
-              <a:t>1/25/2023</a:t>
+              <a:t>1/26/2023</a:t>
             </a:fld>
             <a:endParaRPr lang="en-US"/>
           </a:p>
@@ -1398,7 +1403,7 @@
           <a:p>
             <a:fld id="{082B6261-12F7-4CA1-9F06-F80B9FCC9334}" type="datetimeFigureOut">
               <a:rPr lang="en-US" smtClean="0"/>
-              <a:t>1/25/2023</a:t>
+              <a:t>1/26/2023</a:t>
             </a:fld>
             <a:endParaRPr lang="en-US"/>
           </a:p>
@@ -1810,7 +1815,7 @@
           <a:p>
             <a:fld id="{082B6261-12F7-4CA1-9F06-F80B9FCC9334}" type="datetimeFigureOut">
               <a:rPr lang="en-US" smtClean="0"/>
-              <a:t>1/25/2023</a:t>
+              <a:t>1/26/2023</a:t>
             </a:fld>
             <a:endParaRPr lang="en-US"/>
           </a:p>
@@ -1951,7 +1956,7 @@
           <a:p>
             <a:fld id="{082B6261-12F7-4CA1-9F06-F80B9FCC9334}" type="datetimeFigureOut">
               <a:rPr lang="en-US" smtClean="0"/>
-              <a:t>1/25/2023</a:t>
+              <a:t>1/26/2023</a:t>
             </a:fld>
             <a:endParaRPr lang="en-US"/>
           </a:p>
@@ -2064,7 +2069,7 @@
           <a:p>
             <a:fld id="{082B6261-12F7-4CA1-9F06-F80B9FCC9334}" type="datetimeFigureOut">
               <a:rPr lang="en-US" smtClean="0"/>
-              <a:t>1/25/2023</a:t>
+              <a:t>1/26/2023</a:t>
             </a:fld>
             <a:endParaRPr lang="en-US"/>
           </a:p>
@@ -2375,7 +2380,7 @@
           <a:p>
             <a:fld id="{082B6261-12F7-4CA1-9F06-F80B9FCC9334}" type="datetimeFigureOut">
               <a:rPr lang="en-US" smtClean="0"/>
-              <a:t>1/25/2023</a:t>
+              <a:t>1/26/2023</a:t>
             </a:fld>
             <a:endParaRPr lang="en-US"/>
           </a:p>
@@ -2663,7 +2668,7 @@
           <a:p>
             <a:fld id="{082B6261-12F7-4CA1-9F06-F80B9FCC9334}" type="datetimeFigureOut">
               <a:rPr lang="en-US" smtClean="0"/>
-              <a:t>1/25/2023</a:t>
+              <a:t>1/26/2023</a:t>
             </a:fld>
             <a:endParaRPr lang="en-US"/>
           </a:p>
@@ -2904,7 +2909,7 @@
           <a:p>
             <a:fld id="{082B6261-12F7-4CA1-9F06-F80B9FCC9334}" type="datetimeFigureOut">
               <a:rPr lang="en-US" smtClean="0"/>
-              <a:t>1/25/2023</a:t>
+              <a:t>1/26/2023</a:t>
             </a:fld>
             <a:endParaRPr lang="en-US"/>
           </a:p>
@@ -3335,7 +3340,7 @@
         </p:nvSpPr>
         <p:spPr>
           <a:xfrm>
-            <a:off x="5408102" y="2093754"/>
+            <a:off x="5365768" y="2813421"/>
             <a:ext cx="1375795" cy="2441197"/>
           </a:xfrm>
           <a:prstGeom prst="rect">
@@ -3381,7 +3386,7 @@
         </p:nvSpPr>
         <p:spPr>
           <a:xfrm>
-            <a:off x="8830812" y="2592199"/>
+            <a:off x="8788478" y="3311866"/>
             <a:ext cx="1837189" cy="1837189"/>
           </a:xfrm>
           <a:prstGeom prst="ellipse">
@@ -3427,7 +3432,7 @@
         </p:nvSpPr>
         <p:spPr>
           <a:xfrm>
-            <a:off x="2413234" y="1585520"/>
+            <a:off x="2370900" y="2305187"/>
             <a:ext cx="780176" cy="788565"/>
           </a:xfrm>
           <a:prstGeom prst="rect">
@@ -3455,7 +3460,7 @@
           <a:lstStyle/>
           <a:p>
             <a:pPr algn="ctr"/>
-            <a:endParaRPr lang="en-US"/>
+            <a:endParaRPr lang="en-US" dirty="0"/>
           </a:p>
         </p:txBody>
       </p:sp>
@@ -3473,7 +3478,7 @@
         </p:nvSpPr>
         <p:spPr>
           <a:xfrm>
-            <a:off x="2413234" y="2990675"/>
+            <a:off x="2370900" y="3710342"/>
             <a:ext cx="780176" cy="788565"/>
           </a:xfrm>
           <a:prstGeom prst="rect">
@@ -3519,7 +3524,7 @@
         </p:nvSpPr>
         <p:spPr>
           <a:xfrm>
-            <a:off x="5705912" y="1879134"/>
+            <a:off x="5663578" y="2598801"/>
             <a:ext cx="780176" cy="494951"/>
           </a:xfrm>
           <a:prstGeom prst="rect">
@@ -3565,7 +3570,7 @@
         </p:nvSpPr>
         <p:spPr>
           <a:xfrm>
-            <a:off x="5479409" y="4110605"/>
+            <a:off x="5437075" y="4830272"/>
             <a:ext cx="125835" cy="106611"/>
           </a:xfrm>
           <a:prstGeom prst="flowChartConnector">
@@ -3611,7 +3616,7 @@
         </p:nvSpPr>
         <p:spPr>
           <a:xfrm>
-            <a:off x="5475214" y="4353886"/>
+            <a:off x="5432880" y="5073553"/>
             <a:ext cx="125835" cy="106611"/>
           </a:xfrm>
           <a:prstGeom prst="flowChartConnector">
@@ -3657,7 +3662,7 @@
         </p:nvSpPr>
         <p:spPr>
           <a:xfrm>
-            <a:off x="5479407" y="3882354"/>
+            <a:off x="5437073" y="4602021"/>
             <a:ext cx="125835" cy="106611"/>
           </a:xfrm>
           <a:prstGeom prst="flowChartConnector">
@@ -3703,7 +3708,7 @@
         </p:nvSpPr>
         <p:spPr>
           <a:xfrm>
-            <a:off x="6553900" y="4086840"/>
+            <a:off x="6511566" y="4806507"/>
             <a:ext cx="137019" cy="131079"/>
           </a:xfrm>
           <a:prstGeom prst="flowChartConnector">
@@ -3749,7 +3754,7 @@
         </p:nvSpPr>
         <p:spPr>
           <a:xfrm>
-            <a:off x="6549705" y="4330121"/>
+            <a:off x="6507371" y="5049788"/>
             <a:ext cx="137019" cy="131079"/>
           </a:xfrm>
           <a:prstGeom prst="flowChartConnector">
@@ -3795,7 +3800,7 @@
         </p:nvSpPr>
         <p:spPr>
           <a:xfrm>
-            <a:off x="6553900" y="3604475"/>
+            <a:off x="6511566" y="4324142"/>
             <a:ext cx="137019" cy="131079"/>
           </a:xfrm>
           <a:prstGeom prst="flowChartConnector">
@@ -3841,7 +3846,7 @@
         </p:nvSpPr>
         <p:spPr>
           <a:xfrm>
-            <a:off x="6549705" y="3847756"/>
+            <a:off x="6507371" y="4567423"/>
             <a:ext cx="137019" cy="131079"/>
           </a:xfrm>
           <a:prstGeom prst="flowChartConnector">
@@ -3887,7 +3892,7 @@
         </p:nvSpPr>
         <p:spPr>
           <a:xfrm>
-            <a:off x="6553900" y="2393829"/>
+            <a:off x="6511566" y="3113496"/>
             <a:ext cx="137019" cy="131079"/>
           </a:xfrm>
           <a:prstGeom prst="flowChartConnector">
@@ -3933,7 +3938,7 @@
         </p:nvSpPr>
         <p:spPr>
           <a:xfrm>
-            <a:off x="6549705" y="2637110"/>
+            <a:off x="6507371" y="3356777"/>
             <a:ext cx="137019" cy="131079"/>
           </a:xfrm>
           <a:prstGeom prst="flowChartConnector">
@@ -3979,7 +3984,7 @@
         </p:nvSpPr>
         <p:spPr>
           <a:xfrm>
-            <a:off x="2937895" y="3403657"/>
+            <a:off x="2895561" y="4123324"/>
             <a:ext cx="201336" cy="214272"/>
           </a:xfrm>
           <a:prstGeom prst="flowChartConnector">
@@ -4025,7 +4030,7 @@
         </p:nvSpPr>
         <p:spPr>
           <a:xfrm>
-            <a:off x="2474229" y="3496288"/>
+            <a:off x="2431895" y="4215955"/>
             <a:ext cx="201336" cy="214272"/>
           </a:xfrm>
           <a:prstGeom prst="flowChartConnector">
@@ -4071,7 +4076,7 @@
         </p:nvSpPr>
         <p:spPr>
           <a:xfrm>
-            <a:off x="2937895" y="2040702"/>
+            <a:off x="2895561" y="2760369"/>
             <a:ext cx="201336" cy="214272"/>
           </a:xfrm>
           <a:prstGeom prst="flowChartConnector">
@@ -4117,7 +4122,7 @@
         </p:nvSpPr>
         <p:spPr>
           <a:xfrm>
-            <a:off x="2474229" y="2133333"/>
+            <a:off x="2431895" y="2853000"/>
             <a:ext cx="201336" cy="214272"/>
           </a:xfrm>
           <a:prstGeom prst="flowChartConnector">
@@ -4163,7 +4168,7 @@
         </p:nvSpPr>
         <p:spPr>
           <a:xfrm>
-            <a:off x="3587692" y="2040702"/>
+            <a:off x="3545358" y="2760369"/>
             <a:ext cx="402672" cy="214272"/>
           </a:xfrm>
           <a:prstGeom prst="roundRect">
@@ -4212,7 +4217,7 @@
         </p:nvSpPr>
         <p:spPr>
           <a:xfrm>
-            <a:off x="3789028" y="2040702"/>
+            <a:off x="3746694" y="2760369"/>
             <a:ext cx="100668" cy="214272"/>
           </a:xfrm>
           <a:prstGeom prst="rect">
@@ -4258,7 +4263,7 @@
         </p:nvSpPr>
         <p:spPr>
           <a:xfrm>
-            <a:off x="3587692" y="3448743"/>
+            <a:off x="3545358" y="4168410"/>
             <a:ext cx="402672" cy="214272"/>
           </a:xfrm>
           <a:prstGeom prst="roundRect">
@@ -4307,7 +4312,7 @@
         </p:nvSpPr>
         <p:spPr>
           <a:xfrm>
-            <a:off x="3789028" y="3448743"/>
+            <a:off x="3746694" y="4168410"/>
             <a:ext cx="100668" cy="214272"/>
           </a:xfrm>
           <a:prstGeom prst="rect">
@@ -4357,7 +4362,7 @@
         </p:nvCxnSpPr>
         <p:spPr>
           <a:xfrm>
-            <a:off x="3139231" y="2147838"/>
+            <a:off x="3096897" y="2867505"/>
             <a:ext cx="448461" cy="0"/>
           </a:xfrm>
           <a:prstGeom prst="line">
@@ -4397,7 +4402,7 @@
         </p:nvCxnSpPr>
         <p:spPr>
           <a:xfrm>
-            <a:off x="3139231" y="3510793"/>
+            <a:off x="3096897" y="4230460"/>
             <a:ext cx="448461" cy="45086"/>
           </a:xfrm>
           <a:prstGeom prst="line">
@@ -4436,7 +4441,7 @@
         </p:nvCxnSpPr>
         <p:spPr>
           <a:xfrm rot="16200000" flipH="1">
-            <a:off x="3688885" y="2382300"/>
+            <a:off x="3646551" y="3101967"/>
             <a:ext cx="672340" cy="2900317"/>
           </a:xfrm>
           <a:prstGeom prst="bentConnector4">
@@ -4478,7 +4483,7 @@
         </p:nvCxnSpPr>
         <p:spPr>
           <a:xfrm>
-            <a:off x="2675565" y="2240469"/>
+            <a:off x="2633231" y="2960136"/>
             <a:ext cx="2799649" cy="2155361"/>
           </a:xfrm>
           <a:prstGeom prst="bentConnector3">
@@ -4520,7 +4525,7 @@
         </p:nvCxnSpPr>
         <p:spPr>
           <a:xfrm>
-            <a:off x="3990364" y="2147838"/>
+            <a:off x="3948030" y="2867505"/>
             <a:ext cx="0" cy="1408041"/>
           </a:xfrm>
           <a:prstGeom prst="line">
@@ -4559,7 +4564,7 @@
         </p:nvCxnSpPr>
         <p:spPr>
           <a:xfrm>
-            <a:off x="3990364" y="3555879"/>
+            <a:off x="3948030" y="4275546"/>
             <a:ext cx="1480655" cy="389389"/>
           </a:xfrm>
           <a:prstGeom prst="bentConnector3">
@@ -4601,7 +4606,7 @@
         </p:nvCxnSpPr>
         <p:spPr>
           <a:xfrm flipH="1" flipV="1">
-            <a:off x="6670853" y="2413025"/>
+            <a:off x="6628519" y="3132692"/>
             <a:ext cx="2372225" cy="804038"/>
           </a:xfrm>
           <a:prstGeom prst="line">
@@ -4641,7 +4646,7 @@
         </p:nvCxnSpPr>
         <p:spPr>
           <a:xfrm flipH="1" flipV="1">
-            <a:off x="6549705" y="2702650"/>
+            <a:off x="6507371" y="3422317"/>
             <a:ext cx="2385966" cy="682307"/>
           </a:xfrm>
           <a:prstGeom prst="line">
@@ -4681,7 +4686,7 @@
         </p:nvCxnSpPr>
         <p:spPr>
           <a:xfrm flipH="1">
-            <a:off x="6573966" y="3502574"/>
+            <a:off x="6531632" y="4222241"/>
             <a:ext cx="2487540" cy="121097"/>
           </a:xfrm>
           <a:prstGeom prst="line">
@@ -4721,7 +4726,7 @@
         </p:nvCxnSpPr>
         <p:spPr>
           <a:xfrm flipH="1">
-            <a:off x="6686724" y="3595082"/>
+            <a:off x="6644390" y="4314749"/>
             <a:ext cx="2356354" cy="318214"/>
           </a:xfrm>
           <a:prstGeom prst="line">
@@ -4761,7 +4766,7 @@
         </p:nvCxnSpPr>
         <p:spPr>
           <a:xfrm flipH="1">
-            <a:off x="6690919" y="3761762"/>
+            <a:off x="6648585" y="4481429"/>
             <a:ext cx="2244752" cy="390618"/>
           </a:xfrm>
           <a:prstGeom prst="line">
@@ -4801,7 +4806,7 @@
         </p:nvCxnSpPr>
         <p:spPr>
           <a:xfrm flipH="1">
-            <a:off x="6549705" y="3891963"/>
+            <a:off x="6507371" y="4611630"/>
             <a:ext cx="2385966" cy="503698"/>
           </a:xfrm>
           <a:prstGeom prst="line">
@@ -4837,7 +4842,7 @@
         </p:nvSpPr>
         <p:spPr>
           <a:xfrm>
-            <a:off x="8935671" y="3201450"/>
+            <a:off x="8893337" y="3921117"/>
             <a:ext cx="125835" cy="106611"/>
           </a:xfrm>
           <a:prstGeom prst="flowChartConnector">
@@ -4883,7 +4888,7 @@
         </p:nvSpPr>
         <p:spPr>
           <a:xfrm>
-            <a:off x="8935671" y="3331651"/>
+            <a:off x="8893337" y="4051318"/>
             <a:ext cx="125835" cy="106611"/>
           </a:xfrm>
           <a:prstGeom prst="flowChartConnector">
@@ -4929,7 +4934,7 @@
         </p:nvSpPr>
         <p:spPr>
           <a:xfrm>
-            <a:off x="8935671" y="3449268"/>
+            <a:off x="8893337" y="4168935"/>
             <a:ext cx="125835" cy="106611"/>
           </a:xfrm>
           <a:prstGeom prst="flowChartConnector">
@@ -4975,7 +4980,7 @@
         </p:nvSpPr>
         <p:spPr>
           <a:xfrm>
-            <a:off x="8935671" y="3579469"/>
+            <a:off x="8893337" y="4299136"/>
             <a:ext cx="125835" cy="106611"/>
           </a:xfrm>
           <a:prstGeom prst="flowChartConnector">
@@ -5021,7 +5026,7 @@
         </p:nvSpPr>
         <p:spPr>
           <a:xfrm>
-            <a:off x="8935671" y="3708456"/>
+            <a:off x="8893337" y="4428123"/>
             <a:ext cx="125835" cy="106611"/>
           </a:xfrm>
           <a:prstGeom prst="flowChartConnector">
@@ -5067,7 +5072,7 @@
         </p:nvSpPr>
         <p:spPr>
           <a:xfrm>
-            <a:off x="8935671" y="3838657"/>
+            <a:off x="8893337" y="4558324"/>
             <a:ext cx="125835" cy="106611"/>
           </a:xfrm>
           <a:prstGeom prst="flowChartConnector">
@@ -5113,7 +5118,7 @@
         </p:nvSpPr>
         <p:spPr>
           <a:xfrm>
-            <a:off x="5881579" y="2344227"/>
+            <a:off x="5839245" y="3063894"/>
             <a:ext cx="692387" cy="246221"/>
           </a:xfrm>
           <a:prstGeom prst="rect">
@@ -5136,10 +5141,10 @@
       </p:sp>
       <p:sp>
         <p:nvSpPr>
-          <p:cNvPr id="96" name="TextBox 95">
-            <a:extLst>
-              <a:ext uri="{FF2B5EF4-FFF2-40B4-BE49-F238E27FC236}">
-                <a16:creationId xmlns:a16="http://schemas.microsoft.com/office/drawing/2014/main" id="{542B3122-1745-0DD8-C553-3AC90B281E8C}"/>
+          <p:cNvPr id="97" name="TextBox 96">
+            <a:extLst>
+              <a:ext uri="{FF2B5EF4-FFF2-40B4-BE49-F238E27FC236}">
+                <a16:creationId xmlns:a16="http://schemas.microsoft.com/office/drawing/2014/main" id="{1F8A5EDF-A0F1-0E44-4BA5-C1D35B3F1267}"/>
               </a:ext>
             </a:extLst>
           </p:cNvPr>
@@ -5148,7 +5153,7 @@
         </p:nvSpPr>
         <p:spPr>
           <a:xfrm>
-            <a:off x="6160375" y="2576784"/>
+            <a:off x="5911360" y="4294621"/>
             <a:ext cx="692387" cy="246221"/>
           </a:xfrm>
           <a:prstGeom prst="rect">
@@ -5164,17 +5169,17 @@
           <a:p>
             <a:r>
               <a:rPr lang="en-US" sz="1000" dirty="0"/>
-              <a:t>GND</a:t>
-            </a:r>
-          </a:p>
-        </p:txBody>
-      </p:sp>
-      <p:sp>
-        <p:nvSpPr>
-          <p:cNvPr id="97" name="TextBox 96">
-            <a:extLst>
-              <a:ext uri="{FF2B5EF4-FFF2-40B4-BE49-F238E27FC236}">
-                <a16:creationId xmlns:a16="http://schemas.microsoft.com/office/drawing/2014/main" id="{1F8A5EDF-A0F1-0E44-4BA5-C1D35B3F1267}"/>
+              <a:t>SCLK/B1</a:t>
+            </a:r>
+          </a:p>
+        </p:txBody>
+      </p:sp>
+      <p:sp>
+        <p:nvSpPr>
+          <p:cNvPr id="98" name="TextBox 97">
+            <a:extLst>
+              <a:ext uri="{FF2B5EF4-FFF2-40B4-BE49-F238E27FC236}">
+                <a16:creationId xmlns:a16="http://schemas.microsoft.com/office/drawing/2014/main" id="{04CBB21E-9395-4386-437E-113E53E1C699}"/>
               </a:ext>
             </a:extLst>
           </p:cNvPr>
@@ -5183,7 +5188,7 @@
         </p:nvSpPr>
         <p:spPr>
           <a:xfrm>
-            <a:off x="5953694" y="3574954"/>
+            <a:off x="5876928" y="4534365"/>
             <a:ext cx="692387" cy="246221"/>
           </a:xfrm>
           <a:prstGeom prst="rect">
@@ -5199,17 +5204,17 @@
           <a:p>
             <a:r>
               <a:rPr lang="en-US" sz="1000" dirty="0"/>
-              <a:t>SCLK/B1</a:t>
-            </a:r>
-          </a:p>
-        </p:txBody>
-      </p:sp>
-      <p:sp>
-        <p:nvSpPr>
-          <p:cNvPr id="98" name="TextBox 97">
-            <a:extLst>
-              <a:ext uri="{FF2B5EF4-FFF2-40B4-BE49-F238E27FC236}">
-                <a16:creationId xmlns:a16="http://schemas.microsoft.com/office/drawing/2014/main" id="{04CBB21E-9395-4386-437E-113E53E1C699}"/>
+              <a:t>MISO/B3</a:t>
+            </a:r>
+          </a:p>
+        </p:txBody>
+      </p:sp>
+      <p:sp>
+        <p:nvSpPr>
+          <p:cNvPr id="99" name="TextBox 98">
+            <a:extLst>
+              <a:ext uri="{FF2B5EF4-FFF2-40B4-BE49-F238E27FC236}">
+                <a16:creationId xmlns:a16="http://schemas.microsoft.com/office/drawing/2014/main" id="{8D0ACA34-FF05-2A71-6AF8-1F046CCA5180}"/>
               </a:ext>
             </a:extLst>
           </p:cNvPr>
@@ -5218,7 +5223,7 @@
         </p:nvSpPr>
         <p:spPr>
           <a:xfrm>
-            <a:off x="5919262" y="3814698"/>
+            <a:off x="5861714" y="4771262"/>
             <a:ext cx="692387" cy="246221"/>
           </a:xfrm>
           <a:prstGeom prst="rect">
@@ -5234,17 +5239,17 @@
           <a:p>
             <a:r>
               <a:rPr lang="en-US" sz="1000" dirty="0"/>
-              <a:t>MISO/B3</a:t>
-            </a:r>
-          </a:p>
-        </p:txBody>
-      </p:sp>
-      <p:sp>
-        <p:nvSpPr>
-          <p:cNvPr id="99" name="TextBox 98">
-            <a:extLst>
-              <a:ext uri="{FF2B5EF4-FFF2-40B4-BE49-F238E27FC236}">
-                <a16:creationId xmlns:a16="http://schemas.microsoft.com/office/drawing/2014/main" id="{8D0ACA34-FF05-2A71-6AF8-1F046CCA5180}"/>
+              <a:t>MOSI/B2</a:t>
+            </a:r>
+          </a:p>
+        </p:txBody>
+      </p:sp>
+      <p:sp>
+        <p:nvSpPr>
+          <p:cNvPr id="100" name="TextBox 99">
+            <a:extLst>
+              <a:ext uri="{FF2B5EF4-FFF2-40B4-BE49-F238E27FC236}">
+                <a16:creationId xmlns:a16="http://schemas.microsoft.com/office/drawing/2014/main" id="{AA30E8AC-0F63-8983-559E-E79B84EA376B}"/>
               </a:ext>
             </a:extLst>
           </p:cNvPr>
@@ -5253,7 +5258,7 @@
         </p:nvSpPr>
         <p:spPr>
           <a:xfrm>
-            <a:off x="5904048" y="4051595"/>
+            <a:off x="6017729" y="4974814"/>
             <a:ext cx="692387" cy="246221"/>
           </a:xfrm>
           <a:prstGeom prst="rect">
@@ -5269,17 +5274,17 @@
           <a:p>
             <a:r>
               <a:rPr lang="en-US" sz="1000" dirty="0"/>
-              <a:t>MOSI/B2</a:t>
-            </a:r>
-          </a:p>
-        </p:txBody>
-      </p:sp>
-      <p:sp>
-        <p:nvSpPr>
-          <p:cNvPr id="100" name="TextBox 99">
-            <a:extLst>
-              <a:ext uri="{FF2B5EF4-FFF2-40B4-BE49-F238E27FC236}">
-                <a16:creationId xmlns:a16="http://schemas.microsoft.com/office/drawing/2014/main" id="{AA30E8AC-0F63-8983-559E-E79B84EA376B}"/>
+              <a:t>SS/B6</a:t>
+            </a:r>
+          </a:p>
+        </p:txBody>
+      </p:sp>
+      <p:sp>
+        <p:nvSpPr>
+          <p:cNvPr id="101" name="TextBox 100">
+            <a:extLst>
+              <a:ext uri="{FF2B5EF4-FFF2-40B4-BE49-F238E27FC236}">
+                <a16:creationId xmlns:a16="http://schemas.microsoft.com/office/drawing/2014/main" id="{D31EEBB4-86BA-10C3-CBFD-48F659413B2E}"/>
               </a:ext>
             </a:extLst>
           </p:cNvPr>
@@ -5288,7 +5293,7 @@
         </p:nvSpPr>
         <p:spPr>
           <a:xfrm>
-            <a:off x="6060063" y="4255147"/>
+            <a:off x="4738743" y="4467930"/>
             <a:ext cx="692387" cy="246221"/>
           </a:xfrm>
           <a:prstGeom prst="rect">
@@ -5304,17 +5309,17 @@
           <a:p>
             <a:r>
               <a:rPr lang="en-US" sz="1000" dirty="0"/>
-              <a:t>SS/B6</a:t>
-            </a:r>
-          </a:p>
-        </p:txBody>
-      </p:sp>
-      <p:sp>
-        <p:nvSpPr>
-          <p:cNvPr id="101" name="TextBox 100">
-            <a:extLst>
-              <a:ext uri="{FF2B5EF4-FFF2-40B4-BE49-F238E27FC236}">
-                <a16:creationId xmlns:a16="http://schemas.microsoft.com/office/drawing/2014/main" id="{D31EEBB4-86BA-10C3-CBFD-48F659413B2E}"/>
+              <a:t>Rows E6</a:t>
+            </a:r>
+          </a:p>
+        </p:txBody>
+      </p:sp>
+      <p:sp>
+        <p:nvSpPr>
+          <p:cNvPr id="102" name="TextBox 101">
+            <a:extLst>
+              <a:ext uri="{FF2B5EF4-FFF2-40B4-BE49-F238E27FC236}">
+                <a16:creationId xmlns:a16="http://schemas.microsoft.com/office/drawing/2014/main" id="{5BD76C5B-8E84-90E0-1118-83AF5C0D24A2}"/>
               </a:ext>
             </a:extLst>
           </p:cNvPr>
@@ -5323,8 +5328,8 @@
         </p:nvSpPr>
         <p:spPr>
           <a:xfrm>
-            <a:off x="4781077" y="3748263"/>
-            <a:ext cx="692387" cy="246221"/>
+            <a:off x="4519724" y="4662272"/>
+            <a:ext cx="882917" cy="246221"/>
           </a:xfrm>
           <a:prstGeom prst="rect">
             <a:avLst/>
@@ -5339,17 +5344,17 @@
           <a:p>
             <a:r>
               <a:rPr lang="en-US" sz="1000" dirty="0"/>
-              <a:t>Rows E6</a:t>
-            </a:r>
-          </a:p>
-        </p:txBody>
-      </p:sp>
-      <p:sp>
-        <p:nvSpPr>
-          <p:cNvPr id="102" name="TextBox 101">
-            <a:extLst>
-              <a:ext uri="{FF2B5EF4-FFF2-40B4-BE49-F238E27FC236}">
-                <a16:creationId xmlns:a16="http://schemas.microsoft.com/office/drawing/2014/main" id="{5BD76C5B-8E84-90E0-1118-83AF5C0D24A2}"/>
+              <a:t>Column 2 B4</a:t>
+            </a:r>
+          </a:p>
+        </p:txBody>
+      </p:sp>
+      <p:sp>
+        <p:nvSpPr>
+          <p:cNvPr id="103" name="TextBox 102">
+            <a:extLst>
+              <a:ext uri="{FF2B5EF4-FFF2-40B4-BE49-F238E27FC236}">
+                <a16:creationId xmlns:a16="http://schemas.microsoft.com/office/drawing/2014/main" id="{0243168E-E9D8-98D7-B423-D705A713018C}"/>
               </a:ext>
             </a:extLst>
           </p:cNvPr>
@@ -5358,8 +5363,8 @@
         </p:nvSpPr>
         <p:spPr>
           <a:xfrm>
-            <a:off x="4562058" y="3942605"/>
-            <a:ext cx="1050791" cy="246221"/>
+            <a:off x="4529825" y="4883577"/>
+            <a:ext cx="885442" cy="246221"/>
           </a:xfrm>
           <a:prstGeom prst="rect">
             <a:avLst/>
@@ -5374,17 +5379,17 @@
           <a:p>
             <a:r>
               <a:rPr lang="en-US" sz="1000" dirty="0"/>
-              <a:t>Column 2 B4</a:t>
-            </a:r>
-          </a:p>
-        </p:txBody>
-      </p:sp>
-      <p:sp>
-        <p:nvSpPr>
-          <p:cNvPr id="103" name="TextBox 102">
-            <a:extLst>
-              <a:ext uri="{FF2B5EF4-FFF2-40B4-BE49-F238E27FC236}">
-                <a16:creationId xmlns:a16="http://schemas.microsoft.com/office/drawing/2014/main" id="{0243168E-E9D8-98D7-B423-D705A713018C}"/>
+              <a:t>Column 1 B5</a:t>
+            </a:r>
+          </a:p>
+        </p:txBody>
+      </p:sp>
+      <p:sp>
+        <p:nvSpPr>
+          <p:cNvPr id="104" name="TextBox 103">
+            <a:extLst>
+              <a:ext uri="{FF2B5EF4-FFF2-40B4-BE49-F238E27FC236}">
+                <a16:creationId xmlns:a16="http://schemas.microsoft.com/office/drawing/2014/main" id="{1CDD1CD1-988F-BD5E-A70B-7406A140EBCC}"/>
               </a:ext>
             </a:extLst>
           </p:cNvPr>
@@ -5393,8 +5398,488 @@
         </p:nvSpPr>
         <p:spPr>
           <a:xfrm>
-            <a:off x="4572159" y="4163910"/>
-            <a:ext cx="885442" cy="246221"/>
+            <a:off x="4748387" y="295966"/>
+            <a:ext cx="2695225" cy="369332"/>
+          </a:xfrm>
+          <a:prstGeom prst="rect">
+            <a:avLst/>
+          </a:prstGeom>
+          <a:noFill/>
+        </p:spPr>
+        <p:txBody>
+          <a:bodyPr wrap="none" rtlCol="0">
+            <a:spAutoFit/>
+          </a:bodyPr>
+          <a:lstStyle/>
+          <a:p>
+            <a:r>
+              <a:rPr lang="en-US" u="sng" dirty="0" err="1"/>
+              <a:t>OpenTrack</a:t>
+            </a:r>
+            <a:r>
+              <a:rPr lang="en-US" u="sng" dirty="0"/>
+              <a:t> Wiring Diagram</a:t>
+            </a:r>
+          </a:p>
+        </p:txBody>
+      </p:sp>
+      <p:sp>
+        <p:nvSpPr>
+          <p:cNvPr id="2" name="Flowchart: Connector 1">
+            <a:extLst>
+              <a:ext uri="{FF2B5EF4-FFF2-40B4-BE49-F238E27FC236}">
+                <a16:creationId xmlns:a16="http://schemas.microsoft.com/office/drawing/2014/main" id="{B91DA720-5799-B581-901F-3C94DE3B42F0}"/>
+              </a:ext>
+            </a:extLst>
+          </p:cNvPr>
+          <p:cNvSpPr/>
+          <p:nvPr/>
+        </p:nvSpPr>
+        <p:spPr>
+          <a:xfrm>
+            <a:off x="5437073" y="4193625"/>
+            <a:ext cx="125835" cy="106611"/>
+          </a:xfrm>
+          <a:prstGeom prst="flowChartConnector">
+            <a:avLst/>
+          </a:prstGeom>
+        </p:spPr>
+        <p:style>
+          <a:lnRef idx="2">
+            <a:schemeClr val="dk1">
+              <a:shade val="50000"/>
+            </a:schemeClr>
+          </a:lnRef>
+          <a:fillRef idx="1">
+            <a:schemeClr val="dk1"/>
+          </a:fillRef>
+          <a:effectRef idx="0">
+            <a:schemeClr val="dk1"/>
+          </a:effectRef>
+          <a:fontRef idx="minor">
+            <a:schemeClr val="lt1"/>
+          </a:fontRef>
+        </p:style>
+        <p:txBody>
+          <a:bodyPr rtlCol="0" anchor="ctr"/>
+          <a:lstStyle/>
+          <a:p>
+            <a:pPr algn="ctr"/>
+            <a:endParaRPr lang="en-US"/>
+          </a:p>
+        </p:txBody>
+      </p:sp>
+      <p:sp>
+        <p:nvSpPr>
+          <p:cNvPr id="3" name="Flowchart: Connector 2">
+            <a:extLst>
+              <a:ext uri="{FF2B5EF4-FFF2-40B4-BE49-F238E27FC236}">
+                <a16:creationId xmlns:a16="http://schemas.microsoft.com/office/drawing/2014/main" id="{307B9062-DA5E-F044-70EB-3E849E703AAB}"/>
+              </a:ext>
+            </a:extLst>
+          </p:cNvPr>
+          <p:cNvSpPr/>
+          <p:nvPr/>
+        </p:nvSpPr>
+        <p:spPr>
+          <a:xfrm>
+            <a:off x="5437071" y="3965374"/>
+            <a:ext cx="125835" cy="106611"/>
+          </a:xfrm>
+          <a:prstGeom prst="flowChartConnector">
+            <a:avLst/>
+          </a:prstGeom>
+        </p:spPr>
+        <p:style>
+          <a:lnRef idx="2">
+            <a:schemeClr val="dk1">
+              <a:shade val="50000"/>
+            </a:schemeClr>
+          </a:lnRef>
+          <a:fillRef idx="1">
+            <a:schemeClr val="dk1"/>
+          </a:fillRef>
+          <a:effectRef idx="0">
+            <a:schemeClr val="dk1"/>
+          </a:effectRef>
+          <a:fontRef idx="minor">
+            <a:schemeClr val="lt1"/>
+          </a:fontRef>
+        </p:style>
+        <p:txBody>
+          <a:bodyPr rtlCol="0" anchor="ctr"/>
+          <a:lstStyle/>
+          <a:p>
+            <a:pPr algn="ctr"/>
+            <a:endParaRPr lang="en-US"/>
+          </a:p>
+        </p:txBody>
+      </p:sp>
+      <p:sp>
+        <p:nvSpPr>
+          <p:cNvPr id="11" name="Rectangle 10">
+            <a:extLst>
+              <a:ext uri="{FF2B5EF4-FFF2-40B4-BE49-F238E27FC236}">
+                <a16:creationId xmlns:a16="http://schemas.microsoft.com/office/drawing/2014/main" id="{63D7AF7F-360D-4E64-3DA3-7E28CE9AC87A}"/>
+              </a:ext>
+            </a:extLst>
+          </p:cNvPr>
+          <p:cNvSpPr/>
+          <p:nvPr/>
+        </p:nvSpPr>
+        <p:spPr>
+          <a:xfrm>
+            <a:off x="4330894" y="1660974"/>
+            <a:ext cx="664437" cy="499533"/>
+          </a:xfrm>
+          <a:prstGeom prst="rect">
+            <a:avLst/>
+          </a:prstGeom>
+        </p:spPr>
+        <p:style>
+          <a:lnRef idx="2">
+            <a:schemeClr val="accent3">
+              <a:shade val="50000"/>
+            </a:schemeClr>
+          </a:lnRef>
+          <a:fillRef idx="1">
+            <a:schemeClr val="accent3"/>
+          </a:fillRef>
+          <a:effectRef idx="0">
+            <a:schemeClr val="accent3"/>
+          </a:effectRef>
+          <a:fontRef idx="minor">
+            <a:schemeClr val="lt1"/>
+          </a:fontRef>
+        </p:style>
+        <p:txBody>
+          <a:bodyPr rtlCol="0" anchor="ctr"/>
+          <a:lstStyle/>
+          <a:p>
+            <a:pPr algn="ctr"/>
+            <a:endParaRPr lang="en-US"/>
+          </a:p>
+        </p:txBody>
+      </p:sp>
+      <p:sp>
+        <p:nvSpPr>
+          <p:cNvPr id="12" name="Oval 11">
+            <a:extLst>
+              <a:ext uri="{FF2B5EF4-FFF2-40B4-BE49-F238E27FC236}">
+                <a16:creationId xmlns:a16="http://schemas.microsoft.com/office/drawing/2014/main" id="{43779BC8-3AB8-D5B6-D9DC-2B506F491DFB}"/>
+              </a:ext>
+            </a:extLst>
+          </p:cNvPr>
+          <p:cNvSpPr/>
+          <p:nvPr/>
+        </p:nvSpPr>
+        <p:spPr>
+          <a:xfrm>
+            <a:off x="4330894" y="1317959"/>
+            <a:ext cx="664437" cy="663701"/>
+          </a:xfrm>
+          <a:prstGeom prst="ellipse">
+            <a:avLst/>
+          </a:prstGeom>
+        </p:spPr>
+        <p:style>
+          <a:lnRef idx="2">
+            <a:schemeClr val="accent3">
+              <a:shade val="50000"/>
+            </a:schemeClr>
+          </a:lnRef>
+          <a:fillRef idx="1">
+            <a:schemeClr val="accent3"/>
+          </a:fillRef>
+          <a:effectRef idx="0">
+            <a:schemeClr val="accent3"/>
+          </a:effectRef>
+          <a:fontRef idx="minor">
+            <a:schemeClr val="lt1"/>
+          </a:fontRef>
+        </p:style>
+        <p:txBody>
+          <a:bodyPr rtlCol="0" anchor="ctr"/>
+          <a:lstStyle/>
+          <a:p>
+            <a:pPr algn="ctr"/>
+            <a:endParaRPr lang="en-US"/>
+          </a:p>
+        </p:txBody>
+      </p:sp>
+      <p:sp>
+        <p:nvSpPr>
+          <p:cNvPr id="13" name="Rectangle 12">
+            <a:extLst>
+              <a:ext uri="{FF2B5EF4-FFF2-40B4-BE49-F238E27FC236}">
+                <a16:creationId xmlns:a16="http://schemas.microsoft.com/office/drawing/2014/main" id="{DA3A454C-B37F-1EBF-27B4-AD91A1FA29BD}"/>
+              </a:ext>
+            </a:extLst>
+          </p:cNvPr>
+          <p:cNvSpPr/>
+          <p:nvPr/>
+        </p:nvSpPr>
+        <p:spPr>
+          <a:xfrm>
+            <a:off x="4330894" y="2160507"/>
+            <a:ext cx="100668" cy="314706"/>
+          </a:xfrm>
+          <a:prstGeom prst="rect">
+            <a:avLst/>
+          </a:prstGeom>
+        </p:spPr>
+        <p:style>
+          <a:lnRef idx="2">
+            <a:schemeClr val="accent3">
+              <a:shade val="50000"/>
+            </a:schemeClr>
+          </a:lnRef>
+          <a:fillRef idx="1">
+            <a:schemeClr val="accent3"/>
+          </a:fillRef>
+          <a:effectRef idx="0">
+            <a:schemeClr val="accent3"/>
+          </a:effectRef>
+          <a:fontRef idx="minor">
+            <a:schemeClr val="lt1"/>
+          </a:fontRef>
+        </p:style>
+        <p:txBody>
+          <a:bodyPr rtlCol="0" anchor="ctr"/>
+          <a:lstStyle/>
+          <a:p>
+            <a:pPr algn="ctr"/>
+            <a:endParaRPr lang="en-US"/>
+          </a:p>
+        </p:txBody>
+      </p:sp>
+      <p:sp>
+        <p:nvSpPr>
+          <p:cNvPr id="14" name="Rectangle 13">
+            <a:extLst>
+              <a:ext uri="{FF2B5EF4-FFF2-40B4-BE49-F238E27FC236}">
+                <a16:creationId xmlns:a16="http://schemas.microsoft.com/office/drawing/2014/main" id="{9C94E0F9-895B-401B-C9A7-09C90AEE3C72}"/>
+              </a:ext>
+            </a:extLst>
+          </p:cNvPr>
+          <p:cNvSpPr/>
+          <p:nvPr/>
+        </p:nvSpPr>
+        <p:spPr>
+          <a:xfrm>
+            <a:off x="4612778" y="2160507"/>
+            <a:ext cx="100668" cy="314706"/>
+          </a:xfrm>
+          <a:prstGeom prst="rect">
+            <a:avLst/>
+          </a:prstGeom>
+        </p:spPr>
+        <p:style>
+          <a:lnRef idx="2">
+            <a:schemeClr val="accent3">
+              <a:shade val="50000"/>
+            </a:schemeClr>
+          </a:lnRef>
+          <a:fillRef idx="1">
+            <a:schemeClr val="accent3"/>
+          </a:fillRef>
+          <a:effectRef idx="0">
+            <a:schemeClr val="accent3"/>
+          </a:effectRef>
+          <a:fontRef idx="minor">
+            <a:schemeClr val="lt1"/>
+          </a:fontRef>
+        </p:style>
+        <p:txBody>
+          <a:bodyPr rtlCol="0" anchor="ctr"/>
+          <a:lstStyle/>
+          <a:p>
+            <a:pPr algn="ctr"/>
+            <a:endParaRPr lang="en-US"/>
+          </a:p>
+        </p:txBody>
+      </p:sp>
+      <p:sp>
+        <p:nvSpPr>
+          <p:cNvPr id="16" name="Rectangle 15">
+            <a:extLst>
+              <a:ext uri="{FF2B5EF4-FFF2-40B4-BE49-F238E27FC236}">
+                <a16:creationId xmlns:a16="http://schemas.microsoft.com/office/drawing/2014/main" id="{7493A26B-EE1D-94B3-4CD9-BD170931FFF0}"/>
+              </a:ext>
+            </a:extLst>
+          </p:cNvPr>
+          <p:cNvSpPr/>
+          <p:nvPr/>
+        </p:nvSpPr>
+        <p:spPr>
+          <a:xfrm>
+            <a:off x="4882313" y="2160507"/>
+            <a:ext cx="100668" cy="314706"/>
+          </a:xfrm>
+          <a:prstGeom prst="rect">
+            <a:avLst/>
+          </a:prstGeom>
+        </p:spPr>
+        <p:style>
+          <a:lnRef idx="2">
+            <a:schemeClr val="accent3">
+              <a:shade val="50000"/>
+            </a:schemeClr>
+          </a:lnRef>
+          <a:fillRef idx="1">
+            <a:schemeClr val="accent3"/>
+          </a:fillRef>
+          <a:effectRef idx="0">
+            <a:schemeClr val="accent3"/>
+          </a:effectRef>
+          <a:fontRef idx="minor">
+            <a:schemeClr val="lt1"/>
+          </a:fontRef>
+        </p:style>
+        <p:txBody>
+          <a:bodyPr rtlCol="0" anchor="ctr"/>
+          <a:lstStyle/>
+          <a:p>
+            <a:pPr algn="ctr"/>
+            <a:endParaRPr lang="en-US"/>
+          </a:p>
+        </p:txBody>
+      </p:sp>
+      <p:cxnSp>
+        <p:nvCxnSpPr>
+          <p:cNvPr id="24" name="Connector: Elbow 23">
+            <a:extLst>
+              <a:ext uri="{FF2B5EF4-FFF2-40B4-BE49-F238E27FC236}">
+                <a16:creationId xmlns:a16="http://schemas.microsoft.com/office/drawing/2014/main" id="{E4036882-932F-88FE-6939-B599D4088039}"/>
+              </a:ext>
+            </a:extLst>
+          </p:cNvPr>
+          <p:cNvCxnSpPr>
+            <a:cxnSpLocks/>
+            <a:stCxn id="16" idx="2"/>
+            <a:endCxn id="3" idx="2"/>
+          </p:cNvCxnSpPr>
+          <p:nvPr/>
+        </p:nvCxnSpPr>
+        <p:spPr>
+          <a:xfrm rot="16200000" flipH="1">
+            <a:off x="4413126" y="2994734"/>
+            <a:ext cx="1543467" cy="504424"/>
+          </a:xfrm>
+          <a:prstGeom prst="bentConnector2">
+            <a:avLst/>
+          </a:prstGeom>
+        </p:spPr>
+        <p:style>
+          <a:lnRef idx="3">
+            <a:schemeClr val="dk1"/>
+          </a:lnRef>
+          <a:fillRef idx="0">
+            <a:schemeClr val="dk1"/>
+          </a:fillRef>
+          <a:effectRef idx="2">
+            <a:schemeClr val="dk1"/>
+          </a:effectRef>
+          <a:fontRef idx="minor">
+            <a:schemeClr val="tx1"/>
+          </a:fontRef>
+        </p:style>
+      </p:cxnSp>
+      <p:cxnSp>
+        <p:nvCxnSpPr>
+          <p:cNvPr id="27" name="Connector: Elbow 26">
+            <a:extLst>
+              <a:ext uri="{FF2B5EF4-FFF2-40B4-BE49-F238E27FC236}">
+                <a16:creationId xmlns:a16="http://schemas.microsoft.com/office/drawing/2014/main" id="{7C1EB885-A99C-31ED-9A09-638B0DE06ABA}"/>
+              </a:ext>
+            </a:extLst>
+          </p:cNvPr>
+          <p:cNvCxnSpPr>
+            <a:cxnSpLocks/>
+            <a:endCxn id="2" idx="2"/>
+          </p:cNvCxnSpPr>
+          <p:nvPr/>
+        </p:nvCxnSpPr>
+        <p:spPr>
+          <a:xfrm rot="16200000" flipH="1">
+            <a:off x="4015130" y="2824988"/>
+            <a:ext cx="1780348" cy="1063538"/>
+          </a:xfrm>
+          <a:prstGeom prst="bentConnector2">
+            <a:avLst/>
+          </a:prstGeom>
+        </p:spPr>
+        <p:style>
+          <a:lnRef idx="3">
+            <a:schemeClr val="dk1"/>
+          </a:lnRef>
+          <a:fillRef idx="0">
+            <a:schemeClr val="dk1"/>
+          </a:fillRef>
+          <a:effectRef idx="2">
+            <a:schemeClr val="dk1"/>
+          </a:effectRef>
+          <a:fontRef idx="minor">
+            <a:schemeClr val="tx1"/>
+          </a:fontRef>
+        </p:style>
+      </p:cxnSp>
+      <p:cxnSp>
+        <p:nvCxnSpPr>
+          <p:cNvPr id="29" name="Connector: Elbow 28">
+            <a:extLst>
+              <a:ext uri="{FF2B5EF4-FFF2-40B4-BE49-F238E27FC236}">
+                <a16:creationId xmlns:a16="http://schemas.microsoft.com/office/drawing/2014/main" id="{46F9520B-FCD6-868D-142E-C0A0C74FFDA4}"/>
+              </a:ext>
+            </a:extLst>
+          </p:cNvPr>
+          <p:cNvCxnSpPr>
+            <a:cxnSpLocks/>
+          </p:cNvCxnSpPr>
+          <p:nvPr/>
+        </p:nvCxnSpPr>
+        <p:spPr>
+          <a:xfrm>
+            <a:off x="4644316" y="2484449"/>
+            <a:ext cx="1920118" cy="938652"/>
+          </a:xfrm>
+          <a:prstGeom prst="bentConnector3">
+            <a:avLst>
+              <a:gd name="adj1" fmla="val 614"/>
+            </a:avLst>
+          </a:prstGeom>
+        </p:spPr>
+        <p:style>
+          <a:lnRef idx="3">
+            <a:schemeClr val="accent3"/>
+          </a:lnRef>
+          <a:fillRef idx="0">
+            <a:schemeClr val="accent3"/>
+          </a:fillRef>
+          <a:effectRef idx="2">
+            <a:schemeClr val="accent3"/>
+          </a:effectRef>
+          <a:fontRef idx="minor">
+            <a:schemeClr val="tx1"/>
+          </a:fontRef>
+        </p:style>
+      </p:cxnSp>
+      <p:sp>
+        <p:nvSpPr>
+          <p:cNvPr id="96" name="TextBox 95">
+            <a:extLst>
+              <a:ext uri="{FF2B5EF4-FFF2-40B4-BE49-F238E27FC236}">
+                <a16:creationId xmlns:a16="http://schemas.microsoft.com/office/drawing/2014/main" id="{542B3122-1745-0DD8-C553-3AC90B281E8C}"/>
+              </a:ext>
+            </a:extLst>
+          </p:cNvPr>
+          <p:cNvSpPr txBox="1"/>
+          <p:nvPr/>
+        </p:nvSpPr>
+        <p:spPr>
+          <a:xfrm>
+            <a:off x="6067125" y="3297095"/>
+            <a:ext cx="477676" cy="246221"/>
           </a:xfrm>
           <a:prstGeom prst="rect">
             <a:avLst/>
@@ -5409,17 +5894,63 @@
           <a:p>
             <a:r>
               <a:rPr lang="en-US" sz="1000" dirty="0"/>
-              <a:t>Column 1 B5</a:t>
-            </a:r>
-          </a:p>
-        </p:txBody>
-      </p:sp>
-      <p:sp>
-        <p:nvSpPr>
-          <p:cNvPr id="104" name="TextBox 103">
-            <a:extLst>
-              <a:ext uri="{FF2B5EF4-FFF2-40B4-BE49-F238E27FC236}">
-                <a16:creationId xmlns:a16="http://schemas.microsoft.com/office/drawing/2014/main" id="{1CDD1CD1-988F-BD5E-A70B-7406A140EBCC}"/>
+              <a:t>GND</a:t>
+            </a:r>
+          </a:p>
+        </p:txBody>
+      </p:sp>
+      <p:sp>
+        <p:nvSpPr>
+          <p:cNvPr id="33" name="Hexagon 32">
+            <a:extLst>
+              <a:ext uri="{FF2B5EF4-FFF2-40B4-BE49-F238E27FC236}">
+                <a16:creationId xmlns:a16="http://schemas.microsoft.com/office/drawing/2014/main" id="{6CFB2B3C-E142-E97D-0C0B-37ACD77F2FE3}"/>
+              </a:ext>
+            </a:extLst>
+          </p:cNvPr>
+          <p:cNvSpPr/>
+          <p:nvPr/>
+        </p:nvSpPr>
+        <p:spPr>
+          <a:xfrm>
+            <a:off x="4564967" y="1568152"/>
+            <a:ext cx="196289" cy="172992"/>
+          </a:xfrm>
+          <a:prstGeom prst="hexagon">
+            <a:avLst/>
+          </a:prstGeom>
+        </p:spPr>
+        <p:style>
+          <a:lnRef idx="2">
+            <a:schemeClr val="dk1">
+              <a:shade val="50000"/>
+            </a:schemeClr>
+          </a:lnRef>
+          <a:fillRef idx="1">
+            <a:schemeClr val="dk1"/>
+          </a:fillRef>
+          <a:effectRef idx="0">
+            <a:schemeClr val="dk1"/>
+          </a:effectRef>
+          <a:fontRef idx="minor">
+            <a:schemeClr val="lt1"/>
+          </a:fontRef>
+        </p:style>
+        <p:txBody>
+          <a:bodyPr rtlCol="0" anchor="ctr"/>
+          <a:lstStyle/>
+          <a:p>
+            <a:pPr algn="ctr"/>
+            <a:endParaRPr lang="en-US"/>
+          </a:p>
+        </p:txBody>
+      </p:sp>
+      <p:sp>
+        <p:nvSpPr>
+          <p:cNvPr id="44" name="TextBox 43">
+            <a:extLst>
+              <a:ext uri="{FF2B5EF4-FFF2-40B4-BE49-F238E27FC236}">
+                <a16:creationId xmlns:a16="http://schemas.microsoft.com/office/drawing/2014/main" id="{AAEB83D1-2406-EDB4-30AA-E7E705CB6C54}"/>
               </a:ext>
             </a:extLst>
           </p:cNvPr>
@@ -5428,8 +5959,8 @@
         </p:nvSpPr>
         <p:spPr>
           <a:xfrm>
-            <a:off x="4748387" y="295966"/>
-            <a:ext cx="2695225" cy="369332"/>
+            <a:off x="2339143" y="2394896"/>
+            <a:ext cx="794961" cy="307777"/>
           </a:xfrm>
           <a:prstGeom prst="rect">
             <a:avLst/>
@@ -5443,12 +5974,148 @@
           <a:lstStyle/>
           <a:p>
             <a:r>
-              <a:rPr lang="en-US" u="sng" dirty="0" err="1"/>
-              <a:t>OpenTrack</a:t>
-            </a:r>
-            <a:r>
-              <a:rPr lang="en-US" u="sng" dirty="0"/>
-              <a:t> Wiring Diagram</a:t>
+              <a:rPr lang="en-US" sz="1400" dirty="0"/>
+              <a:t>Switch 1</a:t>
+            </a:r>
+          </a:p>
+        </p:txBody>
+      </p:sp>
+      <p:sp>
+        <p:nvSpPr>
+          <p:cNvPr id="50" name="TextBox 49">
+            <a:extLst>
+              <a:ext uri="{FF2B5EF4-FFF2-40B4-BE49-F238E27FC236}">
+                <a16:creationId xmlns:a16="http://schemas.microsoft.com/office/drawing/2014/main" id="{B069BF32-761C-4269-3C4C-731C13BC4E09}"/>
+              </a:ext>
+            </a:extLst>
+          </p:cNvPr>
+          <p:cNvSpPr txBox="1"/>
+          <p:nvPr/>
+        </p:nvSpPr>
+        <p:spPr>
+          <a:xfrm>
+            <a:off x="2351131" y="3774270"/>
+            <a:ext cx="794961" cy="307777"/>
+          </a:xfrm>
+          <a:prstGeom prst="rect">
+            <a:avLst/>
+          </a:prstGeom>
+          <a:noFill/>
+        </p:spPr>
+        <p:txBody>
+          <a:bodyPr wrap="none" rtlCol="0">
+            <a:spAutoFit/>
+          </a:bodyPr>
+          <a:lstStyle/>
+          <a:p>
+            <a:r>
+              <a:rPr lang="en-US" sz="1400" dirty="0"/>
+              <a:t>Switch 2</a:t>
+            </a:r>
+          </a:p>
+        </p:txBody>
+      </p:sp>
+      <p:sp>
+        <p:nvSpPr>
+          <p:cNvPr id="51" name="TextBox 50">
+            <a:extLst>
+              <a:ext uri="{FF2B5EF4-FFF2-40B4-BE49-F238E27FC236}">
+                <a16:creationId xmlns:a16="http://schemas.microsoft.com/office/drawing/2014/main" id="{860DB224-5095-D191-6BF4-BAB90771AE61}"/>
+              </a:ext>
+            </a:extLst>
+          </p:cNvPr>
+          <p:cNvSpPr txBox="1"/>
+          <p:nvPr/>
+        </p:nvSpPr>
+        <p:spPr>
+          <a:xfrm>
+            <a:off x="5011799" y="3749453"/>
+            <a:ext cx="319318" cy="246221"/>
+          </a:xfrm>
+          <a:prstGeom prst="rect">
+            <a:avLst/>
+          </a:prstGeom>
+          <a:noFill/>
+        </p:spPr>
+        <p:txBody>
+          <a:bodyPr wrap="none" rtlCol="0">
+            <a:spAutoFit/>
+          </a:bodyPr>
+          <a:lstStyle/>
+          <a:p>
+            <a:r>
+              <a:rPr lang="en-US" sz="1000" dirty="0"/>
+              <a:t>C6</a:t>
+            </a:r>
+          </a:p>
+        </p:txBody>
+      </p:sp>
+      <p:sp>
+        <p:nvSpPr>
+          <p:cNvPr id="53" name="TextBox 52">
+            <a:extLst>
+              <a:ext uri="{FF2B5EF4-FFF2-40B4-BE49-F238E27FC236}">
+                <a16:creationId xmlns:a16="http://schemas.microsoft.com/office/drawing/2014/main" id="{E193FE01-7D79-1398-825C-CAB242D7F343}"/>
+              </a:ext>
+            </a:extLst>
+          </p:cNvPr>
+          <p:cNvSpPr txBox="1"/>
+          <p:nvPr/>
+        </p:nvSpPr>
+        <p:spPr>
+          <a:xfrm>
+            <a:off x="5002792" y="4028177"/>
+            <a:ext cx="328936" cy="246221"/>
+          </a:xfrm>
+          <a:prstGeom prst="rect">
+            <a:avLst/>
+          </a:prstGeom>
+          <a:noFill/>
+        </p:spPr>
+        <p:txBody>
+          <a:bodyPr wrap="none" rtlCol="0">
+            <a:spAutoFit/>
+          </a:bodyPr>
+          <a:lstStyle/>
+          <a:p>
+            <a:r>
+              <a:rPr lang="en-US" sz="1000" dirty="0"/>
+              <a:t>D7</a:t>
+            </a:r>
+          </a:p>
+        </p:txBody>
+      </p:sp>
+      <p:sp>
+        <p:nvSpPr>
+          <p:cNvPr id="54" name="TextBox 53">
+            <a:extLst>
+              <a:ext uri="{FF2B5EF4-FFF2-40B4-BE49-F238E27FC236}">
+                <a16:creationId xmlns:a16="http://schemas.microsoft.com/office/drawing/2014/main" id="{1AF99015-0041-A891-6B9E-3AD83ECBF18A}"/>
+              </a:ext>
+            </a:extLst>
+          </p:cNvPr>
+          <p:cNvSpPr txBox="1"/>
+          <p:nvPr/>
+        </p:nvSpPr>
+        <p:spPr>
+          <a:xfrm>
+            <a:off x="4950321" y="3190824"/>
+            <a:ext cx="426720" cy="246221"/>
+          </a:xfrm>
+          <a:prstGeom prst="rect">
+            <a:avLst/>
+          </a:prstGeom>
+          <a:noFill/>
+        </p:spPr>
+        <p:txBody>
+          <a:bodyPr wrap="none" rtlCol="0">
+            <a:spAutoFit/>
+          </a:bodyPr>
+          <a:lstStyle/>
+          <a:p>
+            <a:r>
+              <a:rPr lang="en-US" sz="1000" dirty="0"/>
+              <a:t>GND</a:t>
             </a:r>
           </a:p>
         </p:txBody>

</xml_diff>